<commit_message>
Update entire Excel_analysis folder
</commit_message>
<xml_diff>
--- a/JUMIA SALES ANALYSIS.pptx
+++ b/JUMIA SALES ANALYSIS.pptx
@@ -108,6 +108,11 @@
       </a:defRPr>
     </a:lvl9pPr>
   </p:defaultTextStyle>
+  <p:extLst>
+    <p:ext uri="{EFAFB233-063F-42B5-8137-9DF3F51BA10A}">
+      <p15:sldGuideLst xmlns:p15="http://schemas.microsoft.com/office/powerpoint/2012/main"/>
+    </p:ext>
+  </p:extLst>
 </p:presentation>
 </file>
 
@@ -159,7 +164,6 @@
           </a:p>
         </c:rich>
       </c:tx>
-      <c:layout/>
       <c:overlay val="0"/>
       <c:spPr>
         <a:noFill/>
@@ -468,7 +472,6 @@
     </c:plotArea>
     <c:legend>
       <c:legendPos val="r"/>
-      <c:layout/>
       <c:overlay val="0"/>
       <c:spPr>
         <a:noFill/>
@@ -589,7 +592,6 @@
           </a:p>
         </c:rich>
       </c:tx>
-      <c:layout/>
       <c:overlay val="0"/>
       <c:spPr>
         <a:noFill/>
@@ -2268,9 +2270,7 @@
               </c:spPr>
             </c:leaderLines>
             <c:extLst>
-              <c:ext xmlns:c15="http://schemas.microsoft.com/office/drawing/2012/chart" uri="{CE6537A1-D6FC-4f65-9D91-7224C49458BB}">
-                <c15:layout/>
-              </c:ext>
+              <c:ext xmlns:c15="http://schemas.microsoft.com/office/drawing/2012/chart" uri="{CE6537A1-D6FC-4f65-9D91-7224C49458BB}"/>
             </c:extLst>
           </c:dLbls>
           <c:cat>
@@ -2678,7 +2678,6 @@
     </c:plotArea>
     <c:legend>
       <c:legendPos val="r"/>
-      <c:layout/>
       <c:overlay val="0"/>
       <c:spPr>
         <a:noFill/>
@@ -2799,7 +2798,6 @@
           </a:p>
         </c:rich>
       </c:tx>
-      <c:layout/>
       <c:overlay val="0"/>
       <c:spPr>
         <a:noFill/>
@@ -3573,7 +3571,6 @@
               </a:p>
             </c:rich>
           </c:tx>
-          <c:layout/>
           <c:overlay val="0"/>
           <c:spPr>
             <a:noFill/>
@@ -3694,7 +3691,6 @@
               </a:p>
             </c:rich>
           </c:tx>
-          <c:layout/>
           <c:overlay val="0"/>
           <c:spPr>
             <a:noFill/>
@@ -3769,7 +3765,6 @@
     </c:plotArea>
     <c:legend>
       <c:legendPos val="r"/>
-      <c:layout/>
       <c:overlay val="0"/>
       <c:spPr>
         <a:noFill/>
@@ -3903,7 +3898,6 @@
           </a:p>
         </c:rich>
       </c:tx>
-      <c:layout/>
       <c:overlay val="0"/>
       <c:spPr>
         <a:noFill/>
@@ -4268,7 +4262,6 @@
               </a:p>
             </c:rich>
           </c:tx>
-          <c:layout/>
           <c:overlay val="0"/>
           <c:spPr>
             <a:noFill/>
@@ -4389,7 +4382,6 @@
               </a:p>
             </c:rich>
           </c:tx>
-          <c:layout/>
           <c:overlay val="0"/>
           <c:spPr>
             <a:noFill/>
@@ -4464,7 +4456,6 @@
     </c:plotArea>
     <c:legend>
       <c:legendPos val="r"/>
-      <c:layout/>
       <c:overlay val="0"/>
       <c:spPr>
         <a:noFill/>
@@ -4585,7 +4576,6 @@
           </a:p>
         </c:rich>
       </c:tx>
-      <c:layout/>
       <c:overlay val="0"/>
       <c:spPr>
         <a:noFill/>
@@ -4950,7 +4940,6 @@
               </a:p>
             </c:rich>
           </c:tx>
-          <c:layout/>
           <c:overlay val="0"/>
           <c:spPr>
             <a:noFill/>
@@ -5071,7 +5060,6 @@
               </a:p>
             </c:rich>
           </c:tx>
-          <c:layout/>
           <c:overlay val="0"/>
           <c:spPr>
             <a:noFill/>
@@ -5146,7 +5134,6 @@
     </c:plotArea>
     <c:legend>
       <c:legendPos val="r"/>
-      <c:layout/>
       <c:overlay val="0"/>
       <c:spPr>
         <a:noFill/>
@@ -5267,7 +5254,6 @@
           </a:p>
         </c:rich>
       </c:tx>
-      <c:layout/>
       <c:overlay val="0"/>
       <c:spPr>
         <a:noFill/>
@@ -5632,7 +5618,6 @@
               </a:p>
             </c:rich>
           </c:tx>
-          <c:layout/>
           <c:overlay val="0"/>
           <c:spPr>
             <a:noFill/>
@@ -5753,7 +5738,6 @@
               </a:p>
             </c:rich>
           </c:tx>
-          <c:layout/>
           <c:overlay val="0"/>
           <c:spPr>
             <a:noFill/>
@@ -5828,7 +5812,6 @@
     </c:plotArea>
     <c:legend>
       <c:legendPos val="r"/>
-      <c:layout/>
       <c:overlay val="0"/>
       <c:spPr>
         <a:noFill/>
@@ -9401,7 +9384,7 @@
           <a:p>
             <a:fld id="{7AC5C8B5-BC9A-47AF-96EA-8EF68CB9395F}" type="datetimeFigureOut">
               <a:rPr lang="en-GB" smtClean="0"/>
-              <a:t>15/06/2025</a:t>
+              <a:t>29/06/2025</a:t>
             </a:fld>
             <a:endParaRPr lang="en-GB"/>
           </a:p>
@@ -9609,7 +9592,7 @@
           <a:p>
             <a:fld id="{7AC5C8B5-BC9A-47AF-96EA-8EF68CB9395F}" type="datetimeFigureOut">
               <a:rPr lang="en-GB" smtClean="0"/>
-              <a:t>15/06/2025</a:t>
+              <a:t>29/06/2025</a:t>
             </a:fld>
             <a:endParaRPr lang="en-GB"/>
           </a:p>
@@ -9865,7 +9848,7 @@
           <a:p>
             <a:fld id="{7AC5C8B5-BC9A-47AF-96EA-8EF68CB9395F}" type="datetimeFigureOut">
               <a:rPr lang="en-GB" smtClean="0"/>
-              <a:t>15/06/2025</a:t>
+              <a:t>29/06/2025</a:t>
             </a:fld>
             <a:endParaRPr lang="en-GB"/>
           </a:p>
@@ -10035,7 +10018,7 @@
           <a:p>
             <a:fld id="{7AC5C8B5-BC9A-47AF-96EA-8EF68CB9395F}" type="datetimeFigureOut">
               <a:rPr lang="en-GB" smtClean="0"/>
-              <a:t>15/06/2025</a:t>
+              <a:t>29/06/2025</a:t>
             </a:fld>
             <a:endParaRPr lang="en-GB"/>
           </a:p>
@@ -10378,7 +10361,7 @@
           <a:p>
             <a:fld id="{7AC5C8B5-BC9A-47AF-96EA-8EF68CB9395F}" type="datetimeFigureOut">
               <a:rPr lang="en-GB" smtClean="0"/>
-              <a:t>15/06/2025</a:t>
+              <a:t>29/06/2025</a:t>
             </a:fld>
             <a:endParaRPr lang="en-GB"/>
           </a:p>
@@ -10653,7 +10636,7 @@
           <a:p>
             <a:fld id="{7AC5C8B5-BC9A-47AF-96EA-8EF68CB9395F}" type="datetimeFigureOut">
               <a:rPr lang="en-GB" smtClean="0"/>
-              <a:t>15/06/2025</a:t>
+              <a:t>29/06/2025</a:t>
             </a:fld>
             <a:endParaRPr lang="en-GB"/>
           </a:p>
@@ -11032,7 +11015,7 @@
           <a:p>
             <a:fld id="{7AC5C8B5-BC9A-47AF-96EA-8EF68CB9395F}" type="datetimeFigureOut">
               <a:rPr lang="en-GB" smtClean="0"/>
-              <a:t>15/06/2025</a:t>
+              <a:t>29/06/2025</a:t>
             </a:fld>
             <a:endParaRPr lang="en-GB"/>
           </a:p>
@@ -11150,7 +11133,7 @@
           <a:p>
             <a:fld id="{7AC5C8B5-BC9A-47AF-96EA-8EF68CB9395F}" type="datetimeFigureOut">
               <a:rPr lang="en-GB" smtClean="0"/>
-              <a:t>15/06/2025</a:t>
+              <a:t>29/06/2025</a:t>
             </a:fld>
             <a:endParaRPr lang="en-GB"/>
           </a:p>
@@ -11321,7 +11304,7 @@
           <a:p>
             <a:fld id="{7AC5C8B5-BC9A-47AF-96EA-8EF68CB9395F}" type="datetimeFigureOut">
               <a:rPr lang="en-GB" smtClean="0"/>
-              <a:t>15/06/2025</a:t>
+              <a:t>29/06/2025</a:t>
             </a:fld>
             <a:endParaRPr lang="en-GB"/>
           </a:p>
@@ -11675,7 +11658,7 @@
           <a:p>
             <a:fld id="{7AC5C8B5-BC9A-47AF-96EA-8EF68CB9395F}" type="datetimeFigureOut">
               <a:rPr lang="en-GB" smtClean="0"/>
-              <a:t>15/06/2025</a:t>
+              <a:t>29/06/2025</a:t>
             </a:fld>
             <a:endParaRPr lang="en-GB"/>
           </a:p>
@@ -12052,7 +12035,7 @@
           <a:p>
             <a:fld id="{7AC5C8B5-BC9A-47AF-96EA-8EF68CB9395F}" type="datetimeFigureOut">
               <a:rPr lang="en-GB" smtClean="0"/>
-              <a:t>15/06/2025</a:t>
+              <a:t>29/06/2025</a:t>
             </a:fld>
             <a:endParaRPr lang="en-GB"/>
           </a:p>
@@ -12339,7 +12322,7 @@
           <a:p>
             <a:fld id="{7AC5C8B5-BC9A-47AF-96EA-8EF68CB9395F}" type="datetimeFigureOut">
               <a:rPr lang="en-GB" smtClean="0"/>
-              <a:t>15/06/2025</a:t>
+              <a:t>29/06/2025</a:t>
             </a:fld>
             <a:endParaRPr lang="en-GB"/>
           </a:p>

</xml_diff>